<commit_message>
updated with MAE loss
</commit_message>
<xml_diff>
--- a/docs/flowchart.pptx
+++ b/docs/flowchart.pptx
@@ -262,7 +262,7 @@
           <a:p>
             <a:fld id="{F27C38F0-F5BB-4837-A82B-79F10CA4EDA6}" type="datetimeFigureOut">
               <a:rPr lang="en-US" smtClean="0"/>
-              <a:t>9/14/23</a:t>
+              <a:t>9/17/23</a:t>
             </a:fld>
             <a:endParaRPr lang="en-US"/>
           </a:p>
@@ -460,7 +460,7 @@
           <a:p>
             <a:fld id="{F27C38F0-F5BB-4837-A82B-79F10CA4EDA6}" type="datetimeFigureOut">
               <a:rPr lang="en-US" smtClean="0"/>
-              <a:t>9/14/23</a:t>
+              <a:t>9/17/23</a:t>
             </a:fld>
             <a:endParaRPr lang="en-US"/>
           </a:p>
@@ -668,7 +668,7 @@
           <a:p>
             <a:fld id="{F27C38F0-F5BB-4837-A82B-79F10CA4EDA6}" type="datetimeFigureOut">
               <a:rPr lang="en-US" smtClean="0"/>
-              <a:t>9/14/23</a:t>
+              <a:t>9/17/23</a:t>
             </a:fld>
             <a:endParaRPr lang="en-US"/>
           </a:p>
@@ -866,7 +866,7 @@
           <a:p>
             <a:fld id="{F27C38F0-F5BB-4837-A82B-79F10CA4EDA6}" type="datetimeFigureOut">
               <a:rPr lang="en-US" smtClean="0"/>
-              <a:t>9/14/23</a:t>
+              <a:t>9/17/23</a:t>
             </a:fld>
             <a:endParaRPr lang="en-US"/>
           </a:p>
@@ -1141,7 +1141,7 @@
           <a:p>
             <a:fld id="{F27C38F0-F5BB-4837-A82B-79F10CA4EDA6}" type="datetimeFigureOut">
               <a:rPr lang="en-US" smtClean="0"/>
-              <a:t>9/14/23</a:t>
+              <a:t>9/17/23</a:t>
             </a:fld>
             <a:endParaRPr lang="en-US"/>
           </a:p>
@@ -1406,7 +1406,7 @@
           <a:p>
             <a:fld id="{F27C38F0-F5BB-4837-A82B-79F10CA4EDA6}" type="datetimeFigureOut">
               <a:rPr lang="en-US" smtClean="0"/>
-              <a:t>9/14/23</a:t>
+              <a:t>9/17/23</a:t>
             </a:fld>
             <a:endParaRPr lang="en-US"/>
           </a:p>
@@ -1818,7 +1818,7 @@
           <a:p>
             <a:fld id="{F27C38F0-F5BB-4837-A82B-79F10CA4EDA6}" type="datetimeFigureOut">
               <a:rPr lang="en-US" smtClean="0"/>
-              <a:t>9/14/23</a:t>
+              <a:t>9/17/23</a:t>
             </a:fld>
             <a:endParaRPr lang="en-US"/>
           </a:p>
@@ -1959,7 +1959,7 @@
           <a:p>
             <a:fld id="{F27C38F0-F5BB-4837-A82B-79F10CA4EDA6}" type="datetimeFigureOut">
               <a:rPr lang="en-US" smtClean="0"/>
-              <a:t>9/14/23</a:t>
+              <a:t>9/17/23</a:t>
             </a:fld>
             <a:endParaRPr lang="en-US"/>
           </a:p>
@@ -2072,7 +2072,7 @@
           <a:p>
             <a:fld id="{F27C38F0-F5BB-4837-A82B-79F10CA4EDA6}" type="datetimeFigureOut">
               <a:rPr lang="en-US" smtClean="0"/>
-              <a:t>9/14/23</a:t>
+              <a:t>9/17/23</a:t>
             </a:fld>
             <a:endParaRPr lang="en-US"/>
           </a:p>
@@ -2383,7 +2383,7 @@
           <a:p>
             <a:fld id="{F27C38F0-F5BB-4837-A82B-79F10CA4EDA6}" type="datetimeFigureOut">
               <a:rPr lang="en-US" smtClean="0"/>
-              <a:t>9/14/23</a:t>
+              <a:t>9/17/23</a:t>
             </a:fld>
             <a:endParaRPr lang="en-US"/>
           </a:p>
@@ -2671,7 +2671,7 @@
           <a:p>
             <a:fld id="{F27C38F0-F5BB-4837-A82B-79F10CA4EDA6}" type="datetimeFigureOut">
               <a:rPr lang="en-US" smtClean="0"/>
-              <a:t>9/14/23</a:t>
+              <a:t>9/17/23</a:t>
             </a:fld>
             <a:endParaRPr lang="en-US"/>
           </a:p>
@@ -2912,7 +2912,7 @@
           <a:p>
             <a:fld id="{F27C38F0-F5BB-4837-A82B-79F10CA4EDA6}" type="datetimeFigureOut">
               <a:rPr lang="en-US" smtClean="0"/>
-              <a:t>9/14/23</a:t>
+              <a:t>9/17/23</a:t>
             </a:fld>
             <a:endParaRPr lang="en-US"/>
           </a:p>
@@ -4680,41 +4680,6 @@
           </a:graphicData>
         </a:graphic>
       </p:graphicFrame>
-      <p:sp>
-        <p:nvSpPr>
-          <p:cNvPr id="2" name="Rectangle 1">
-            <a:extLst>
-              <a:ext uri="{FF2B5EF4-FFF2-40B4-BE49-F238E27FC236}">
-                <a16:creationId xmlns:a16="http://schemas.microsoft.com/office/drawing/2014/main" id="{8DD48D28-6B23-644F-BB16-DF07A2B60178}"/>
-              </a:ext>
-            </a:extLst>
-          </p:cNvPr>
-          <p:cNvSpPr/>
-          <p:nvPr/>
-        </p:nvSpPr>
-        <p:spPr>
-          <a:xfrm>
-            <a:off x="4289351" y="3244334"/>
-            <a:ext cx="3613297" cy="369332"/>
-          </a:xfrm>
-          <a:prstGeom prst="rect">
-            <a:avLst/>
-          </a:prstGeom>
-        </p:spPr>
-        <p:txBody>
-          <a:bodyPr wrap="none">
-            <a:spAutoFit/>
-          </a:bodyPr>
-          <a:lstStyle/>
-          <a:p>
-            <a:r>
-              <a:rPr lang="en-US" dirty="0" err="1"/>
-              <a:t>pierre.brechard@kaminoanlabs.com</a:t>
-            </a:r>
-            <a:endParaRPr lang="en-US" dirty="0"/>
-          </a:p>
-        </p:txBody>
-      </p:sp>
     </p:spTree>
     <p:extLst>
       <p:ext uri="{BB962C8B-B14F-4D97-AF65-F5344CB8AC3E}">

</xml_diff>